<commit_message>
ho aggiunto una "t" in bucket in una slide
</commit_message>
<xml_diff>
--- a/Distributed Hash-breaker.pptx
+++ b/Distributed Hash-breaker.pptx
@@ -265,7 +265,7 @@
             <a:pPr rtl="0"/>
             <a:fld id="{EB190EFE-CCCB-4DCD-B1CF-8C3CB119D6FE}" type="datetime1">
               <a:rPr lang="it-IT" smtClean="0"/>
-              <a:t>21/05/2020</a:t>
+              <a:t>21/05/20</a:t>
             </a:fld>
             <a:endParaRPr lang="it-IT" dirty="0"/>
           </a:p>
@@ -345,7 +345,7 @@
             <a:pPr rtl="0"/>
             <a:fld id="{B4E85F6F-0FAD-4AD4-850C-7E4CD14D7D70}" type="slidenum">
               <a:rPr lang="it-IT" smtClean="0"/>
-              <a:t>‹#›</a:t>
+              <a:t>‹N›</a:t>
             </a:fld>
             <a:endParaRPr lang="it-IT" dirty="0"/>
           </a:p>
@@ -446,7 +446,7 @@
             <a:fld id="{526AC070-77AE-44FC-B0C8-108B581F9765}" type="datetime1">
               <a:rPr lang="it-IT" noProof="0" smtClean="0"/>
               <a:pPr/>
-              <a:t>21/05/2020</a:t>
+              <a:t>21/05/20</a:t>
             </a:fld>
             <a:endParaRPr lang="it-IT" noProof="0" dirty="0"/>
           </a:p>
@@ -607,7 +607,7 @@
             <a:pPr rtl="0"/>
             <a:fld id="{BE60DC36-8EFA-4378-9855-E019C55AC472}" type="slidenum">
               <a:rPr lang="it-IT" noProof="0" smtClean="0"/>
-              <a:t>‹#›</a:t>
+              <a:t>‹N›</a:t>
             </a:fld>
             <a:endParaRPr lang="it-IT" noProof="0" dirty="0"/>
           </a:p>
@@ -2451,7 +2451,7 @@
             <a:pPr rtl="0"/>
             <a:fld id="{73953276-A596-464E-8131-16FDC4642D35}" type="datetime1">
               <a:rPr lang="it-IT" noProof="0" smtClean="0"/>
-              <a:t>21/05/2020</a:t>
+              <a:t>21/05/20</a:t>
             </a:fld>
             <a:endParaRPr lang="it-IT" noProof="0" dirty="0"/>
           </a:p>
@@ -2507,7 +2507,7 @@
             <a:pPr rtl="0"/>
             <a:fld id="{06FEDF93-2BFD-41CA-ABC7-B039102F3792}" type="slidenum">
               <a:rPr lang="it-IT" noProof="0" smtClean="0"/>
-              <a:t>‹#›</a:t>
+              <a:t>‹N›</a:t>
             </a:fld>
             <a:endParaRPr lang="it-IT" noProof="0" dirty="0"/>
           </a:p>
@@ -2655,7 +2655,7 @@
             <a:pPr rtl="0"/>
             <a:fld id="{59F66E3F-D06F-47DA-A95C-C846DE23F8C0}" type="datetime1">
               <a:rPr lang="it-IT" noProof="0" smtClean="0"/>
-              <a:t>21/05/2020</a:t>
+              <a:t>21/05/20</a:t>
             </a:fld>
             <a:endParaRPr lang="it-IT" noProof="0" dirty="0"/>
           </a:p>
@@ -2711,7 +2711,7 @@
             <a:pPr rtl="0"/>
             <a:fld id="{06FEDF93-2BFD-41CA-ABC7-B039102F3792}" type="slidenum">
               <a:rPr lang="it-IT" noProof="0" smtClean="0"/>
-              <a:t>‹#›</a:t>
+              <a:t>‹N›</a:t>
             </a:fld>
             <a:endParaRPr lang="it-IT" noProof="0" dirty="0"/>
           </a:p>
@@ -2869,7 +2869,7 @@
             <a:pPr rtl="0"/>
             <a:fld id="{46FE6513-E3C7-4048-AC2F-41B0D1F6D895}" type="datetime1">
               <a:rPr lang="it-IT" noProof="0" smtClean="0"/>
-              <a:t>21/05/2020</a:t>
+              <a:t>21/05/20</a:t>
             </a:fld>
             <a:endParaRPr lang="it-IT" noProof="0" dirty="0"/>
           </a:p>
@@ -2925,7 +2925,7 @@
             <a:pPr rtl="0"/>
             <a:fld id="{06FEDF93-2BFD-41CA-ABC7-B039102F3792}" type="slidenum">
               <a:rPr lang="it-IT" noProof="0" smtClean="0"/>
-              <a:t>‹#›</a:t>
+              <a:t>‹N›</a:t>
             </a:fld>
             <a:endParaRPr lang="it-IT" noProof="0" dirty="0"/>
           </a:p>
@@ -3073,7 +3073,7 @@
             <a:pPr rtl="0"/>
             <a:fld id="{4CA1E7DF-6F8F-47CE-8C70-53A994FBF180}" type="datetime1">
               <a:rPr lang="it-IT" noProof="0" smtClean="0"/>
-              <a:t>21/05/2020</a:t>
+              <a:t>21/05/20</a:t>
             </a:fld>
             <a:endParaRPr lang="it-IT" noProof="0" dirty="0"/>
           </a:p>
@@ -3129,7 +3129,7 @@
             <a:pPr rtl="0"/>
             <a:fld id="{06FEDF93-2BFD-41CA-ABC7-B039102F3792}" type="slidenum">
               <a:rPr lang="it-IT" noProof="0" smtClean="0"/>
-              <a:t>‹#›</a:t>
+              <a:t>‹N›</a:t>
             </a:fld>
             <a:endParaRPr lang="it-IT" noProof="0" dirty="0"/>
           </a:p>
@@ -3353,7 +3353,7 @@
             <a:pPr rtl="0"/>
             <a:fld id="{2CFB8710-ABAB-4285-AF31-02779743E1F4}" type="datetime1">
               <a:rPr lang="it-IT" noProof="0" smtClean="0"/>
-              <a:t>21/05/2020</a:t>
+              <a:t>21/05/20</a:t>
             </a:fld>
             <a:endParaRPr lang="it-IT" noProof="0" dirty="0"/>
           </a:p>
@@ -3409,7 +3409,7 @@
             <a:pPr rtl="0"/>
             <a:fld id="{06FEDF93-2BFD-41CA-ABC7-B039102F3792}" type="slidenum">
               <a:rPr lang="it-IT" noProof="0" smtClean="0"/>
-              <a:t>‹#›</a:t>
+              <a:t>‹N›</a:t>
             </a:fld>
             <a:endParaRPr lang="it-IT" noProof="0" dirty="0"/>
           </a:p>
@@ -3625,7 +3625,7 @@
             <a:pPr rtl="0"/>
             <a:fld id="{FE1FD3F1-0F70-4F3C-841E-3B4B1A9982AD}" type="datetime1">
               <a:rPr lang="it-IT" noProof="0" smtClean="0"/>
-              <a:t>21/05/2020</a:t>
+              <a:t>21/05/20</a:t>
             </a:fld>
             <a:endParaRPr lang="it-IT" noProof="0" dirty="0"/>
           </a:p>
@@ -3681,7 +3681,7 @@
             <a:pPr rtl="0"/>
             <a:fld id="{06FEDF93-2BFD-41CA-ABC7-B039102F3792}" type="slidenum">
               <a:rPr lang="it-IT" noProof="0" smtClean="0"/>
-              <a:t>‹#›</a:t>
+              <a:t>‹N›</a:t>
             </a:fld>
             <a:endParaRPr lang="it-IT" noProof="0" dirty="0"/>
           </a:p>
@@ -4044,7 +4044,7 @@
             <a:pPr rtl="0"/>
             <a:fld id="{3195CD94-E959-4436-A899-6BFB5CD81E9E}" type="datetime1">
               <a:rPr lang="it-IT" noProof="0" smtClean="0"/>
-              <a:t>21/05/2020</a:t>
+              <a:t>21/05/20</a:t>
             </a:fld>
             <a:endParaRPr lang="it-IT" noProof="0" dirty="0"/>
           </a:p>
@@ -4100,7 +4100,7 @@
             <a:pPr rtl="0"/>
             <a:fld id="{06FEDF93-2BFD-41CA-ABC7-B039102F3792}" type="slidenum">
               <a:rPr lang="it-IT" noProof="0" smtClean="0"/>
-              <a:t>‹#›</a:t>
+              <a:t>‹N›</a:t>
             </a:fld>
             <a:endParaRPr lang="it-IT" noProof="0" dirty="0"/>
           </a:p>
@@ -4190,7 +4190,7 @@
             <a:pPr rtl="0"/>
             <a:fld id="{327B0C7F-749B-466A-A38A-03B1C8A2F06C}" type="datetime1">
               <a:rPr lang="it-IT" noProof="0" smtClean="0"/>
-              <a:t>21/05/2020</a:t>
+              <a:t>21/05/20</a:t>
             </a:fld>
             <a:endParaRPr lang="it-IT" noProof="0" dirty="0"/>
           </a:p>
@@ -4246,7 +4246,7 @@
             <a:pPr rtl="0"/>
             <a:fld id="{06FEDF93-2BFD-41CA-ABC7-B039102F3792}" type="slidenum">
               <a:rPr lang="it-IT" noProof="0" smtClean="0"/>
-              <a:t>‹#›</a:t>
+              <a:t>‹N›</a:t>
             </a:fld>
             <a:endParaRPr lang="it-IT" noProof="0" dirty="0"/>
           </a:p>
@@ -4306,7 +4306,7 @@
             <a:pPr rtl="0"/>
             <a:fld id="{DEC309BE-2E90-45F2-A626-98CE1308C9C4}" type="datetime1">
               <a:rPr lang="it-IT" noProof="0" smtClean="0"/>
-              <a:t>21/05/2020</a:t>
+              <a:t>21/05/20</a:t>
             </a:fld>
             <a:endParaRPr lang="it-IT" noProof="0" dirty="0"/>
           </a:p>
@@ -4362,7 +4362,7 @@
             <a:pPr rtl="0"/>
             <a:fld id="{06FEDF93-2BFD-41CA-ABC7-B039102F3792}" type="slidenum">
               <a:rPr lang="it-IT" noProof="0" smtClean="0"/>
-              <a:t>‹#›</a:t>
+              <a:t>‹N›</a:t>
             </a:fld>
             <a:endParaRPr lang="it-IT" noProof="0" dirty="0"/>
           </a:p>
@@ -4623,7 +4623,7 @@
             <a:pPr rtl="0"/>
             <a:fld id="{D7D791A9-9A19-4C7D-9EDF-F6B9F670B73C}" type="datetime1">
               <a:rPr lang="it-IT" noProof="0" smtClean="0"/>
-              <a:t>21/05/2020</a:t>
+              <a:t>21/05/20</a:t>
             </a:fld>
             <a:endParaRPr lang="it-IT" noProof="0" dirty="0"/>
           </a:p>
@@ -4679,7 +4679,7 @@
             <a:pPr rtl="0"/>
             <a:fld id="{06FEDF93-2BFD-41CA-ABC7-B039102F3792}" type="slidenum">
               <a:rPr lang="it-IT" noProof="0" smtClean="0"/>
-              <a:t>‹#›</a:t>
+              <a:t>‹N›</a:t>
             </a:fld>
             <a:endParaRPr lang="it-IT" noProof="0" dirty="0"/>
           </a:p>
@@ -4921,7 +4921,7 @@
             <a:pPr rtl="0"/>
             <a:fld id="{1C87147A-BE07-4D89-850F-642EAF1AAEA9}" type="datetime1">
               <a:rPr lang="it-IT" noProof="0" smtClean="0"/>
-              <a:t>21/05/2020</a:t>
+              <a:t>21/05/20</a:t>
             </a:fld>
             <a:endParaRPr lang="it-IT" noProof="0" dirty="0"/>
           </a:p>
@@ -4977,7 +4977,7 @@
             <a:pPr rtl="0"/>
             <a:fld id="{06FEDF93-2BFD-41CA-ABC7-B039102F3792}" type="slidenum">
               <a:rPr lang="it-IT" noProof="0" smtClean="0"/>
-              <a:t>‹#›</a:t>
+              <a:t>‹N›</a:t>
             </a:fld>
             <a:endParaRPr lang="it-IT" noProof="0" dirty="0"/>
           </a:p>
@@ -5166,7 +5166,7 @@
             <a:pPr rtl="0"/>
             <a:fld id="{750AD8DE-E201-43F1-B9CB-48547493CA6A}" type="datetime1">
               <a:rPr lang="it-IT" noProof="0" smtClean="0"/>
-              <a:t>21/05/2020</a:t>
+              <a:t>21/05/20</a:t>
             </a:fld>
             <a:endParaRPr lang="it-IT" noProof="0" dirty="0"/>
           </a:p>
@@ -5258,7 +5258,7 @@
             <a:pPr rtl="0"/>
             <a:fld id="{06FEDF93-2BFD-41CA-ABC7-B039102F3792}" type="slidenum">
               <a:rPr lang="it-IT" noProof="0" smtClean="0"/>
-              <a:t>‹#›</a:t>
+              <a:t>‹N›</a:t>
             </a:fld>
             <a:endParaRPr lang="it-IT" noProof="0" dirty="0"/>
           </a:p>
@@ -27629,7 +27629,7 @@
             </a:r>
             <a:r>
               <a:rPr lang="it-IT" sz="2800" b="1" dirty="0" err="1"/>
-              <a:t>bucke</a:t>
+              <a:t>bucket</a:t>
             </a:r>
             <a:r>
               <a:rPr lang="it-IT" sz="2800" b="1" dirty="0"/>

</xml_diff>